<commit_message>
Fixed bug with max variable default value
</commit_message>
<xml_diff>
--- a/SEMESTRÁLNÍ PRÁCE ČÍSLO 27.pptx
+++ b/SEMESTRÁLNÍ PRÁCE ČÍSLO 27.pptx
@@ -127,6 +127,11 @@
       </a:defRPr>
     </a:lvl9pPr>
   </p:defaultTextStyle>
+  <p:extLst>
+    <p:ext uri="{EFAFB233-063F-42B5-8137-9DF3F51BA10A}">
+      <p15:sldGuideLst xmlns:p15="http://schemas.microsoft.com/office/powerpoint/2012/main"/>
+    </p:ext>
+  </p:extLst>
 </p:presentation>
 </file>
 
@@ -5105,10 +5110,10 @@
       </p:sp>
       <p:pic>
         <p:nvPicPr>
-          <p:cNvPr id="7" name="Zástupný obsah 6">
-            <a:extLst>
-              <a:ext uri="{FF2B5EF4-FFF2-40B4-BE49-F238E27FC236}">
-                <a16:creationId xmlns:a16="http://schemas.microsoft.com/office/drawing/2014/main" id="{EF4A5C90-0C98-D3AD-48C9-DB78DB2800BE}"/>
+          <p:cNvPr id="6" name="Zástupný obsah 5">
+            <a:extLst>
+              <a:ext uri="{FF2B5EF4-FFF2-40B4-BE49-F238E27FC236}">
+                <a16:creationId xmlns:a16="http://schemas.microsoft.com/office/drawing/2014/main" id="{13D965AE-C492-5A89-B0B1-CA0383876741}"/>
               </a:ext>
             </a:extLst>
           </p:cNvPr>
@@ -5133,8 +5138,8 @@
         </p:blipFill>
         <p:spPr>
           <a:xfrm>
-            <a:off x="5595457" y="18255"/>
-            <a:ext cx="6596543" cy="6839745"/>
+            <a:off x="5228437" y="0"/>
+            <a:ext cx="6963563" cy="6858000"/>
           </a:xfrm>
         </p:spPr>
       </p:pic>

</xml_diff>